<commit_message>
Add repo web scraping, notes fundamental selenium and beautifulsoup
</commit_message>
<xml_diff>
--- a/DataAnalytics/Dashboarding/Catalog.pptx
+++ b/DataAnalytics/Dashboarding/Catalog.pptx
@@ -9,6 +9,7 @@
     <p:sldId id="257" r:id="rId3"/>
     <p:sldId id="258" r:id="rId4"/>
     <p:sldId id="259" r:id="rId5"/>
+    <p:sldId id="260" r:id="rId6"/>
   </p:sldIdLst>
   <p:sldSz cx="12192000" cy="6858000"/>
   <p:notesSz cx="6858000" cy="9144000"/>
@@ -264,7 +265,7 @@
           <a:p>
             <a:fld id="{3FE0E71D-2F57-4C75-8C8A-BAB5529F1F24}" type="datetimeFigureOut">
               <a:rPr lang="en-ID" smtClean="0"/>
-              <a:t>05/06/2024</a:t>
+              <a:t>13/06/2024</a:t>
             </a:fld>
             <a:endParaRPr lang="en-ID"/>
           </a:p>
@@ -464,7 +465,7 @@
           <a:p>
             <a:fld id="{3FE0E71D-2F57-4C75-8C8A-BAB5529F1F24}" type="datetimeFigureOut">
               <a:rPr lang="en-ID" smtClean="0"/>
-              <a:t>05/06/2024</a:t>
+              <a:t>13/06/2024</a:t>
             </a:fld>
             <a:endParaRPr lang="en-ID"/>
           </a:p>
@@ -674,7 +675,7 @@
           <a:p>
             <a:fld id="{3FE0E71D-2F57-4C75-8C8A-BAB5529F1F24}" type="datetimeFigureOut">
               <a:rPr lang="en-ID" smtClean="0"/>
-              <a:t>05/06/2024</a:t>
+              <a:t>13/06/2024</a:t>
             </a:fld>
             <a:endParaRPr lang="en-ID"/>
           </a:p>
@@ -874,7 +875,7 @@
           <a:p>
             <a:fld id="{3FE0E71D-2F57-4C75-8C8A-BAB5529F1F24}" type="datetimeFigureOut">
               <a:rPr lang="en-ID" smtClean="0"/>
-              <a:t>05/06/2024</a:t>
+              <a:t>13/06/2024</a:t>
             </a:fld>
             <a:endParaRPr lang="en-ID"/>
           </a:p>
@@ -1150,7 +1151,7 @@
           <a:p>
             <a:fld id="{3FE0E71D-2F57-4C75-8C8A-BAB5529F1F24}" type="datetimeFigureOut">
               <a:rPr lang="en-ID" smtClean="0"/>
-              <a:t>05/06/2024</a:t>
+              <a:t>13/06/2024</a:t>
             </a:fld>
             <a:endParaRPr lang="en-ID"/>
           </a:p>
@@ -1418,7 +1419,7 @@
           <a:p>
             <a:fld id="{3FE0E71D-2F57-4C75-8C8A-BAB5529F1F24}" type="datetimeFigureOut">
               <a:rPr lang="en-ID" smtClean="0"/>
-              <a:t>05/06/2024</a:t>
+              <a:t>13/06/2024</a:t>
             </a:fld>
             <a:endParaRPr lang="en-ID"/>
           </a:p>
@@ -1833,7 +1834,7 @@
           <a:p>
             <a:fld id="{3FE0E71D-2F57-4C75-8C8A-BAB5529F1F24}" type="datetimeFigureOut">
               <a:rPr lang="en-ID" smtClean="0"/>
-              <a:t>05/06/2024</a:t>
+              <a:t>13/06/2024</a:t>
             </a:fld>
             <a:endParaRPr lang="en-ID"/>
           </a:p>
@@ -1975,7 +1976,7 @@
           <a:p>
             <a:fld id="{3FE0E71D-2F57-4C75-8C8A-BAB5529F1F24}" type="datetimeFigureOut">
               <a:rPr lang="en-ID" smtClean="0"/>
-              <a:t>05/06/2024</a:t>
+              <a:t>13/06/2024</a:t>
             </a:fld>
             <a:endParaRPr lang="en-ID"/>
           </a:p>
@@ -2088,7 +2089,7 @@
           <a:p>
             <a:fld id="{3FE0E71D-2F57-4C75-8C8A-BAB5529F1F24}" type="datetimeFigureOut">
               <a:rPr lang="en-ID" smtClean="0"/>
-              <a:t>05/06/2024</a:t>
+              <a:t>13/06/2024</a:t>
             </a:fld>
             <a:endParaRPr lang="en-ID"/>
           </a:p>
@@ -2401,7 +2402,7 @@
           <a:p>
             <a:fld id="{3FE0E71D-2F57-4C75-8C8A-BAB5529F1F24}" type="datetimeFigureOut">
               <a:rPr lang="en-ID" smtClean="0"/>
-              <a:t>05/06/2024</a:t>
+              <a:t>13/06/2024</a:t>
             </a:fld>
             <a:endParaRPr lang="en-ID"/>
           </a:p>
@@ -2690,7 +2691,7 @@
           <a:p>
             <a:fld id="{3FE0E71D-2F57-4C75-8C8A-BAB5529F1F24}" type="datetimeFigureOut">
               <a:rPr lang="en-ID" smtClean="0"/>
-              <a:t>05/06/2024</a:t>
+              <a:t>13/06/2024</a:t>
             </a:fld>
             <a:endParaRPr lang="en-ID"/>
           </a:p>
@@ -2933,7 +2934,7 @@
           <a:p>
             <a:fld id="{3FE0E71D-2F57-4C75-8C8A-BAB5529F1F24}" type="datetimeFigureOut">
               <a:rPr lang="en-ID" smtClean="0"/>
-              <a:t>05/06/2024</a:t>
+              <a:t>13/06/2024</a:t>
             </a:fld>
             <a:endParaRPr lang="en-ID"/>
           </a:p>
@@ -4278,6 +4279,150 @@
 </p:sld>
 </file>
 
+<file path=ppt/slides/slide5.xml><?xml version="1.0" encoding="utf-8"?>
+<p:sld xmlns:a="http://schemas.openxmlformats.org/drawingml/2006/main" xmlns:r="http://schemas.openxmlformats.org/officeDocument/2006/relationships" xmlns:p="http://schemas.openxmlformats.org/presentationml/2006/main">
+  <p:cSld>
+    <p:spTree>
+      <p:nvGrpSpPr>
+        <p:cNvPr id="1" name=""/>
+        <p:cNvGrpSpPr/>
+        <p:nvPr/>
+      </p:nvGrpSpPr>
+      <p:grpSpPr>
+        <a:xfrm>
+          <a:off x="0" y="0"/>
+          <a:ext cx="0" cy="0"/>
+          <a:chOff x="0" y="0"/>
+          <a:chExt cx="0" cy="0"/>
+        </a:xfrm>
+      </p:grpSpPr>
+      <p:sp>
+        <p:nvSpPr>
+          <p:cNvPr id="2" name="Title 1">
+            <a:extLst>
+              <a:ext uri="{FF2B5EF4-FFF2-40B4-BE49-F238E27FC236}">
+                <a16:creationId xmlns:a16="http://schemas.microsoft.com/office/drawing/2014/main" id="{EC5CDD88-38F0-5E10-C52D-BE3F349E24C5}"/>
+              </a:ext>
+            </a:extLst>
+          </p:cNvPr>
+          <p:cNvSpPr>
+            <a:spLocks noGrp="1"/>
+          </p:cNvSpPr>
+          <p:nvPr>
+            <p:ph type="title"/>
+          </p:nvPr>
+        </p:nvSpPr>
+        <p:spPr>
+          <a:xfrm>
+            <a:off x="838200" y="136525"/>
+            <a:ext cx="10515600" cy="1325563"/>
+          </a:xfrm>
+        </p:spPr>
+        <p:txBody>
+          <a:bodyPr/>
+          <a:lstStyle/>
+          <a:p>
+            <a:r>
+              <a:rPr lang="en-ID" b="0" i="0" dirty="0">
+                <a:effectLst/>
+                <a:latin typeface="Roboto" panose="02000000000000000000" pitchFamily="2" charset="0"/>
+              </a:rPr>
+              <a:t>Customer Cohort Analysis</a:t>
+            </a:r>
+            <a:endParaRPr lang="en-ID" dirty="0"/>
+          </a:p>
+        </p:txBody>
+      </p:sp>
+      <p:sp>
+        <p:nvSpPr>
+          <p:cNvPr id="3" name="Content Placeholder 2">
+            <a:extLst>
+              <a:ext uri="{FF2B5EF4-FFF2-40B4-BE49-F238E27FC236}">
+                <a16:creationId xmlns:a16="http://schemas.microsoft.com/office/drawing/2014/main" id="{6281CAE8-B512-D046-C8FE-5AB0440236B4}"/>
+              </a:ext>
+            </a:extLst>
+          </p:cNvPr>
+          <p:cNvSpPr>
+            <a:spLocks noGrp="1"/>
+          </p:cNvSpPr>
+          <p:nvPr>
+            <p:ph idx="1"/>
+          </p:nvPr>
+        </p:nvSpPr>
+        <p:spPr>
+          <a:xfrm>
+            <a:off x="2500460" y="6161349"/>
+            <a:ext cx="9691540" cy="663051"/>
+          </a:xfrm>
+        </p:spPr>
+        <p:txBody>
+          <a:bodyPr>
+            <a:normAutofit/>
+          </a:bodyPr>
+          <a:lstStyle/>
+          <a:p>
+            <a:pPr marL="0" indent="0" algn="l">
+              <a:buNone/>
+            </a:pPr>
+            <a:r>
+              <a:rPr lang="en-US" dirty="0">
+                <a:solidFill>
+                  <a:srgbClr val="2D3237"/>
+                </a:solidFill>
+                <a:highlight>
+                  <a:srgbClr val="FFFFFF"/>
+                </a:highlight>
+                <a:latin typeface="Geist"/>
+              </a:rPr>
+              <a:t>Ref: https://www.shopify.com/id/blog/marketing-analytics</a:t>
+            </a:r>
+            <a:endParaRPr lang="en-ID" dirty="0"/>
+          </a:p>
+        </p:txBody>
+      </p:sp>
+      <p:pic>
+        <p:nvPicPr>
+          <p:cNvPr id="6" name="Picture 5">
+            <a:extLst>
+              <a:ext uri="{FF2B5EF4-FFF2-40B4-BE49-F238E27FC236}">
+                <a16:creationId xmlns:a16="http://schemas.microsoft.com/office/drawing/2014/main" id="{B0393640-2A41-5FB5-853D-781E4990B591}"/>
+              </a:ext>
+            </a:extLst>
+          </p:cNvPr>
+          <p:cNvPicPr>
+            <a:picLocks noChangeAspect="1"/>
+          </p:cNvPicPr>
+          <p:nvPr/>
+        </p:nvPicPr>
+        <p:blipFill>
+          <a:blip r:embed="rId2"/>
+          <a:stretch>
+            <a:fillRect/>
+          </a:stretch>
+        </p:blipFill>
+        <p:spPr>
+          <a:xfrm>
+            <a:off x="1662020" y="1133998"/>
+            <a:ext cx="8867960" cy="5027351"/>
+          </a:xfrm>
+          <a:prstGeom prst="rect">
+            <a:avLst/>
+          </a:prstGeom>
+        </p:spPr>
+      </p:pic>
+    </p:spTree>
+    <p:extLst>
+      <p:ext uri="{BB962C8B-B14F-4D97-AF65-F5344CB8AC3E}">
+        <p14:creationId xmlns:p14="http://schemas.microsoft.com/office/powerpoint/2010/main" val="3107281350"/>
+      </p:ext>
+    </p:extLst>
+  </p:cSld>
+  <p:clrMapOvr>
+    <a:masterClrMapping/>
+  </p:clrMapOvr>
+</p:sld>
+</file>
+
 <file path=ppt/theme/theme1.xml><?xml version="1.0" encoding="utf-8"?>
 <a:theme xmlns:a="http://schemas.openxmlformats.org/drawingml/2006/main" name="Office Theme">
   <a:themeElements>

</xml_diff>